<commit_message>
Implement "Fig 3: arrow heads #46"
</commit_message>
<xml_diff>
--- a/hscc2017/figures/verification-flow.pptx
+++ b/hscc2017/figures/verification-flow.pptx
@@ -304,7 +304,7 @@
           <a:p>
             <a:fld id="{24600E32-1EDA-9448-8110-B067D99F7BD4}" type="datetimeFigureOut">
               <a:rPr lang="en-US" smtClean="0"/>
-              <a:t>10/14/2016</a:t>
+              <a:t>12/28/2016</a:t>
             </a:fld>
             <a:endParaRPr lang="en-US"/>
           </a:p>
@@ -474,7 +474,7 @@
           <a:p>
             <a:fld id="{24600E32-1EDA-9448-8110-B067D99F7BD4}" type="datetimeFigureOut">
               <a:rPr lang="en-US" smtClean="0"/>
-              <a:t>10/14/2016</a:t>
+              <a:t>12/28/2016</a:t>
             </a:fld>
             <a:endParaRPr lang="en-US"/>
           </a:p>
@@ -654,7 +654,7 @@
           <a:p>
             <a:fld id="{24600E32-1EDA-9448-8110-B067D99F7BD4}" type="datetimeFigureOut">
               <a:rPr lang="en-US" smtClean="0"/>
-              <a:t>10/14/2016</a:t>
+              <a:t>12/28/2016</a:t>
             </a:fld>
             <a:endParaRPr lang="en-US"/>
           </a:p>
@@ -824,7 +824,7 @@
           <a:p>
             <a:fld id="{24600E32-1EDA-9448-8110-B067D99F7BD4}" type="datetimeFigureOut">
               <a:rPr lang="en-US" smtClean="0"/>
-              <a:t>10/14/2016</a:t>
+              <a:t>12/28/2016</a:t>
             </a:fld>
             <a:endParaRPr lang="en-US"/>
           </a:p>
@@ -1070,7 +1070,7 @@
           <a:p>
             <a:fld id="{24600E32-1EDA-9448-8110-B067D99F7BD4}" type="datetimeFigureOut">
               <a:rPr lang="en-US" smtClean="0"/>
-              <a:t>10/14/2016</a:t>
+              <a:t>12/28/2016</a:t>
             </a:fld>
             <a:endParaRPr lang="en-US"/>
           </a:p>
@@ -1358,7 +1358,7 @@
           <a:p>
             <a:fld id="{24600E32-1EDA-9448-8110-B067D99F7BD4}" type="datetimeFigureOut">
               <a:rPr lang="en-US" smtClean="0"/>
-              <a:t>10/14/2016</a:t>
+              <a:t>12/28/2016</a:t>
             </a:fld>
             <a:endParaRPr lang="en-US"/>
           </a:p>
@@ -1780,7 +1780,7 @@
           <a:p>
             <a:fld id="{24600E32-1EDA-9448-8110-B067D99F7BD4}" type="datetimeFigureOut">
               <a:rPr lang="en-US" smtClean="0"/>
-              <a:t>10/14/2016</a:t>
+              <a:t>12/28/2016</a:t>
             </a:fld>
             <a:endParaRPr lang="en-US"/>
           </a:p>
@@ -1898,7 +1898,7 @@
           <a:p>
             <a:fld id="{24600E32-1EDA-9448-8110-B067D99F7BD4}" type="datetimeFigureOut">
               <a:rPr lang="en-US" smtClean="0"/>
-              <a:t>10/14/2016</a:t>
+              <a:t>12/28/2016</a:t>
             </a:fld>
             <a:endParaRPr lang="en-US"/>
           </a:p>
@@ -1993,7 +1993,7 @@
           <a:p>
             <a:fld id="{24600E32-1EDA-9448-8110-B067D99F7BD4}" type="datetimeFigureOut">
               <a:rPr lang="en-US" smtClean="0"/>
-              <a:t>10/14/2016</a:t>
+              <a:t>12/28/2016</a:t>
             </a:fld>
             <a:endParaRPr lang="en-US"/>
           </a:p>
@@ -2270,7 +2270,7 @@
           <a:p>
             <a:fld id="{24600E32-1EDA-9448-8110-B067D99F7BD4}" type="datetimeFigureOut">
               <a:rPr lang="en-US" smtClean="0"/>
-              <a:t>10/14/2016</a:t>
+              <a:t>12/28/2016</a:t>
             </a:fld>
             <a:endParaRPr lang="en-US"/>
           </a:p>
@@ -2523,7 +2523,7 @@
           <a:p>
             <a:fld id="{24600E32-1EDA-9448-8110-B067D99F7BD4}" type="datetimeFigureOut">
               <a:rPr lang="en-US" smtClean="0"/>
-              <a:t>10/14/2016</a:t>
+              <a:t>12/28/2016</a:t>
             </a:fld>
             <a:endParaRPr lang="en-US"/>
           </a:p>
@@ -2736,7 +2736,7 @@
           <a:p>
             <a:fld id="{24600E32-1EDA-9448-8110-B067D99F7BD4}" type="datetimeFigureOut">
               <a:rPr lang="en-US" smtClean="0"/>
-              <a:t>10/14/2016</a:t>
+              <a:t>12/28/2016</a:t>
             </a:fld>
             <a:endParaRPr lang="en-US"/>
           </a:p>
@@ -3113,7 +3113,7 @@
       </p:grpSpPr>
       <p:grpSp>
         <p:nvGrpSpPr>
-          <p:cNvPr id="10" name="Grupo 9"/>
+          <p:cNvPr id="2" name="Grupo 1"/>
           <p:cNvGrpSpPr/>
           <p:nvPr/>
         </p:nvGrpSpPr>
@@ -3199,135 +3199,120 @@
             </a:p>
           </p:txBody>
         </p:sp>
-        <p:grpSp>
-          <p:nvGrpSpPr>
-            <p:cNvPr id="48" name="Group 47"/>
-            <p:cNvGrpSpPr/>
+        <p:cxnSp>
+          <p:nvCxnSpPr>
+            <p:cNvPr id="23" name="Straight Arrow Connector 22"/>
+            <p:cNvCxnSpPr/>
             <p:nvPr/>
-          </p:nvGrpSpPr>
-          <p:grpSpPr>
-            <a:xfrm rot="16200000">
-              <a:off x="96675" y="1702642"/>
-              <a:ext cx="243399" cy="583699"/>
-              <a:chOff x="3376545" y="5409984"/>
-              <a:chExt cx="243399" cy="351072"/>
+          </p:nvCxnSpPr>
+          <p:spPr>
+            <a:xfrm>
+              <a:off x="-73476" y="2115930"/>
+              <a:ext cx="583696" cy="261"/>
             </a:xfrm>
-          </p:grpSpPr>
-          <p:cxnSp>
-            <p:nvCxnSpPr>
-              <p:cNvPr id="23" name="Straight Arrow Connector 22"/>
-              <p:cNvCxnSpPr/>
-              <p:nvPr/>
-            </p:nvCxnSpPr>
-            <p:spPr>
-              <a:xfrm rot="5400000">
-                <a:off x="3201141" y="5585388"/>
-                <a:ext cx="351070" cy="261"/>
-              </a:xfrm>
-              <a:prstGeom prst="straightConnector1">
-                <a:avLst/>
-              </a:prstGeom>
-              <a:ln w="6350" cmpd="sng">
-                <a:solidFill>
-                  <a:srgbClr val="000000"/>
-                </a:solidFill>
-                <a:headEnd type="none"/>
-                <a:tailEnd type="triangle"/>
-              </a:ln>
-              <a:effectLst/>
-            </p:spPr>
-            <p:style>
-              <a:lnRef idx="2">
-                <a:schemeClr val="accent1"/>
-              </a:lnRef>
-              <a:fillRef idx="0">
-                <a:schemeClr val="accent1"/>
-              </a:fillRef>
-              <a:effectRef idx="1">
-                <a:schemeClr val="accent1"/>
-              </a:effectRef>
-              <a:fontRef idx="minor">
-                <a:schemeClr val="tx1"/>
-              </a:fontRef>
-            </p:style>
-          </p:cxnSp>
-          <p:cxnSp>
-            <p:nvCxnSpPr>
-              <p:cNvPr id="51" name="Straight Arrow Connector 50"/>
-              <p:cNvCxnSpPr/>
-              <p:nvPr/>
-            </p:nvCxnSpPr>
-            <p:spPr>
-              <a:xfrm rot="5400000">
-                <a:off x="3326406" y="5585389"/>
-                <a:ext cx="351070" cy="261"/>
-              </a:xfrm>
-              <a:prstGeom prst="straightConnector1">
-                <a:avLst/>
-              </a:prstGeom>
-              <a:ln w="6350" cmpd="sng">
-                <a:solidFill>
-                  <a:srgbClr val="000000"/>
-                </a:solidFill>
-                <a:headEnd type="none"/>
-                <a:tailEnd type="triangle"/>
-              </a:ln>
-              <a:effectLst/>
-            </p:spPr>
-            <p:style>
-              <a:lnRef idx="2">
-                <a:schemeClr val="accent1"/>
-              </a:lnRef>
-              <a:fillRef idx="0">
-                <a:schemeClr val="accent1"/>
-              </a:fillRef>
-              <a:effectRef idx="1">
-                <a:schemeClr val="accent1"/>
-              </a:effectRef>
-              <a:fontRef idx="minor">
-                <a:schemeClr val="tx1"/>
-              </a:fontRef>
-            </p:style>
-          </p:cxnSp>
-          <p:cxnSp>
-            <p:nvCxnSpPr>
-              <p:cNvPr id="52" name="Straight Arrow Connector 51"/>
-              <p:cNvCxnSpPr/>
-              <p:nvPr/>
-            </p:nvCxnSpPr>
-            <p:spPr>
-              <a:xfrm rot="5400000">
-                <a:off x="3444279" y="5585390"/>
-                <a:ext cx="351070" cy="261"/>
-              </a:xfrm>
-              <a:prstGeom prst="straightConnector1">
-                <a:avLst/>
-              </a:prstGeom>
-              <a:ln w="6350" cmpd="sng">
-                <a:solidFill>
-                  <a:srgbClr val="000000"/>
-                </a:solidFill>
-                <a:headEnd type="none"/>
-                <a:tailEnd type="triangle"/>
-              </a:ln>
-              <a:effectLst/>
-            </p:spPr>
-            <p:style>
-              <a:lnRef idx="2">
-                <a:schemeClr val="accent1"/>
-              </a:lnRef>
-              <a:fillRef idx="0">
-                <a:schemeClr val="accent1"/>
-              </a:fillRef>
-              <a:effectRef idx="1">
-                <a:schemeClr val="accent1"/>
-              </a:effectRef>
-              <a:fontRef idx="minor">
-                <a:schemeClr val="tx1"/>
-              </a:fontRef>
-            </p:style>
-          </p:cxnSp>
-        </p:grpSp>
+            <a:prstGeom prst="straightConnector1">
+              <a:avLst/>
+            </a:prstGeom>
+            <a:ln w="6350" cmpd="sng">
+              <a:solidFill>
+                <a:srgbClr val="000000"/>
+              </a:solidFill>
+              <a:headEnd type="none"/>
+              <a:tailEnd type="stealth"/>
+            </a:ln>
+            <a:effectLst/>
+          </p:spPr>
+          <p:style>
+            <a:lnRef idx="2">
+              <a:schemeClr val="accent1"/>
+            </a:lnRef>
+            <a:fillRef idx="0">
+              <a:schemeClr val="accent1"/>
+            </a:fillRef>
+            <a:effectRef idx="1">
+              <a:schemeClr val="accent1"/>
+            </a:effectRef>
+            <a:fontRef idx="minor">
+              <a:schemeClr val="tx1"/>
+            </a:fontRef>
+          </p:style>
+        </p:cxnSp>
+        <p:cxnSp>
+          <p:nvCxnSpPr>
+            <p:cNvPr id="51" name="Straight Arrow Connector 50"/>
+            <p:cNvCxnSpPr/>
+            <p:nvPr/>
+          </p:nvCxnSpPr>
+          <p:spPr>
+            <a:xfrm>
+              <a:off x="-73474" y="1990665"/>
+              <a:ext cx="583696" cy="261"/>
+            </a:xfrm>
+            <a:prstGeom prst="straightConnector1">
+              <a:avLst/>
+            </a:prstGeom>
+            <a:ln w="6350" cmpd="sng">
+              <a:solidFill>
+                <a:srgbClr val="000000"/>
+              </a:solidFill>
+              <a:headEnd type="none"/>
+              <a:tailEnd type="stealth"/>
+            </a:ln>
+            <a:effectLst/>
+          </p:spPr>
+          <p:style>
+            <a:lnRef idx="2">
+              <a:schemeClr val="accent1"/>
+            </a:lnRef>
+            <a:fillRef idx="0">
+              <a:schemeClr val="accent1"/>
+            </a:fillRef>
+            <a:effectRef idx="1">
+              <a:schemeClr val="accent1"/>
+            </a:effectRef>
+            <a:fontRef idx="minor">
+              <a:schemeClr val="tx1"/>
+            </a:fontRef>
+          </p:style>
+        </p:cxnSp>
+        <p:cxnSp>
+          <p:nvCxnSpPr>
+            <p:cNvPr id="52" name="Straight Arrow Connector 51"/>
+            <p:cNvCxnSpPr/>
+            <p:nvPr/>
+          </p:nvCxnSpPr>
+          <p:spPr>
+            <a:xfrm>
+              <a:off x="-73473" y="1872792"/>
+              <a:ext cx="583696" cy="261"/>
+            </a:xfrm>
+            <a:prstGeom prst="straightConnector1">
+              <a:avLst/>
+            </a:prstGeom>
+            <a:ln w="6350" cmpd="sng">
+              <a:solidFill>
+                <a:srgbClr val="000000"/>
+              </a:solidFill>
+              <a:headEnd type="none"/>
+              <a:tailEnd type="stealth"/>
+            </a:ln>
+            <a:effectLst/>
+          </p:spPr>
+          <p:style>
+            <a:lnRef idx="2">
+              <a:schemeClr val="accent1"/>
+            </a:lnRef>
+            <a:fillRef idx="0">
+              <a:schemeClr val="accent1"/>
+            </a:fillRef>
+            <a:effectRef idx="1">
+              <a:schemeClr val="accent1"/>
+            </a:effectRef>
+            <a:fontRef idx="minor">
+              <a:schemeClr val="tx1"/>
+            </a:fontRef>
+          </p:style>
+        </p:cxnSp>
         <p:grpSp>
           <p:nvGrpSpPr>
             <p:cNvPr id="3" name="Group 2"/>
@@ -3975,7 +3960,7 @@
                 <a:srgbClr val="000000"/>
               </a:solidFill>
               <a:headEnd type="none"/>
-              <a:tailEnd type="triangle"/>
+              <a:tailEnd type="stealth"/>
             </a:ln>
             <a:effectLst/>
           </p:spPr>
@@ -4015,7 +4000,7 @@
                 <a:srgbClr val="000000"/>
               </a:solidFill>
               <a:headEnd type="none"/>
-              <a:tailEnd type="triangle"/>
+              <a:tailEnd type="stealth"/>
             </a:ln>
             <a:effectLst/>
           </p:spPr>
@@ -4497,7 +4482,7 @@
                 <a:srgbClr val="000000"/>
               </a:solidFill>
               <a:headEnd type="none"/>
-              <a:tailEnd type="triangle"/>
+              <a:tailEnd type="stealth"/>
             </a:ln>
             <a:effectLst/>
           </p:spPr>
@@ -4538,7 +4523,7 @@
                 <a:srgbClr val="000000"/>
               </a:solidFill>
               <a:headEnd type="none"/>
-              <a:tailEnd type="triangle"/>
+              <a:tailEnd type="stealth"/>
             </a:ln>
             <a:effectLst/>
           </p:spPr>
@@ -4579,7 +4564,7 @@
                 <a:srgbClr val="000000"/>
               </a:solidFill>
               <a:headEnd type="none"/>
-              <a:tailEnd type="triangle"/>
+              <a:tailEnd type="stealth"/>
             </a:ln>
             <a:effectLst/>
           </p:spPr>
@@ -4656,135 +4641,120 @@
             </a:p>
           </p:txBody>
         </p:sp>
-        <p:grpSp>
-          <p:nvGrpSpPr>
-            <p:cNvPr id="96" name="Group 95"/>
-            <p:cNvGrpSpPr/>
+        <p:cxnSp>
+          <p:nvCxnSpPr>
+            <p:cNvPr id="97" name="Straight Arrow Connector 96"/>
+            <p:cNvCxnSpPr/>
             <p:nvPr/>
-          </p:nvGrpSpPr>
-          <p:grpSpPr>
-            <a:xfrm rot="16200000">
-              <a:off x="99804" y="2745771"/>
-              <a:ext cx="243399" cy="583699"/>
-              <a:chOff x="3376545" y="5409984"/>
-              <a:chExt cx="243399" cy="351072"/>
+          </p:nvCxnSpPr>
+          <p:spPr>
+            <a:xfrm>
+              <a:off x="-70347" y="3159059"/>
+              <a:ext cx="583696" cy="261"/>
             </a:xfrm>
-          </p:grpSpPr>
-          <p:cxnSp>
-            <p:nvCxnSpPr>
-              <p:cNvPr id="97" name="Straight Arrow Connector 96"/>
-              <p:cNvCxnSpPr/>
-              <p:nvPr/>
-            </p:nvCxnSpPr>
-            <p:spPr>
-              <a:xfrm rot="5400000">
-                <a:off x="3201141" y="5585388"/>
-                <a:ext cx="351070" cy="261"/>
-              </a:xfrm>
-              <a:prstGeom prst="straightConnector1">
-                <a:avLst/>
-              </a:prstGeom>
-              <a:ln w="6350" cmpd="sng">
-                <a:solidFill>
-                  <a:srgbClr val="000000"/>
-                </a:solidFill>
-                <a:headEnd type="none"/>
-                <a:tailEnd type="triangle"/>
-              </a:ln>
-              <a:effectLst/>
-            </p:spPr>
-            <p:style>
-              <a:lnRef idx="2">
-                <a:schemeClr val="accent1"/>
-              </a:lnRef>
-              <a:fillRef idx="0">
-                <a:schemeClr val="accent1"/>
-              </a:fillRef>
-              <a:effectRef idx="1">
-                <a:schemeClr val="accent1"/>
-              </a:effectRef>
-              <a:fontRef idx="minor">
-                <a:schemeClr val="tx1"/>
-              </a:fontRef>
-            </p:style>
-          </p:cxnSp>
-          <p:cxnSp>
-            <p:nvCxnSpPr>
-              <p:cNvPr id="98" name="Straight Arrow Connector 97"/>
-              <p:cNvCxnSpPr/>
-              <p:nvPr/>
-            </p:nvCxnSpPr>
-            <p:spPr>
-              <a:xfrm rot="5400000">
-                <a:off x="3326406" y="5585389"/>
-                <a:ext cx="351070" cy="261"/>
-              </a:xfrm>
-              <a:prstGeom prst="straightConnector1">
-                <a:avLst/>
-              </a:prstGeom>
-              <a:ln w="6350" cmpd="sng">
-                <a:solidFill>
-                  <a:srgbClr val="000000"/>
-                </a:solidFill>
-                <a:headEnd type="none"/>
-                <a:tailEnd type="triangle"/>
-              </a:ln>
-              <a:effectLst/>
-            </p:spPr>
-            <p:style>
-              <a:lnRef idx="2">
-                <a:schemeClr val="accent1"/>
-              </a:lnRef>
-              <a:fillRef idx="0">
-                <a:schemeClr val="accent1"/>
-              </a:fillRef>
-              <a:effectRef idx="1">
-                <a:schemeClr val="accent1"/>
-              </a:effectRef>
-              <a:fontRef idx="minor">
-                <a:schemeClr val="tx1"/>
-              </a:fontRef>
-            </p:style>
-          </p:cxnSp>
-          <p:cxnSp>
-            <p:nvCxnSpPr>
-              <p:cNvPr id="99" name="Straight Arrow Connector 98"/>
-              <p:cNvCxnSpPr/>
-              <p:nvPr/>
-            </p:nvCxnSpPr>
-            <p:spPr>
-              <a:xfrm rot="5400000">
-                <a:off x="3444279" y="5585390"/>
-                <a:ext cx="351070" cy="261"/>
-              </a:xfrm>
-              <a:prstGeom prst="straightConnector1">
-                <a:avLst/>
-              </a:prstGeom>
-              <a:ln w="6350" cmpd="sng">
-                <a:solidFill>
-                  <a:srgbClr val="000000"/>
-                </a:solidFill>
-                <a:headEnd type="none"/>
-                <a:tailEnd type="triangle"/>
-              </a:ln>
-              <a:effectLst/>
-            </p:spPr>
-            <p:style>
-              <a:lnRef idx="2">
-                <a:schemeClr val="accent1"/>
-              </a:lnRef>
-              <a:fillRef idx="0">
-                <a:schemeClr val="accent1"/>
-              </a:fillRef>
-              <a:effectRef idx="1">
-                <a:schemeClr val="accent1"/>
-              </a:effectRef>
-              <a:fontRef idx="minor">
-                <a:schemeClr val="tx1"/>
-              </a:fontRef>
-            </p:style>
-          </p:cxnSp>
-        </p:grpSp>
+            <a:prstGeom prst="straightConnector1">
+              <a:avLst/>
+            </a:prstGeom>
+            <a:ln w="6350" cmpd="sng">
+              <a:solidFill>
+                <a:srgbClr val="000000"/>
+              </a:solidFill>
+              <a:headEnd type="none"/>
+              <a:tailEnd type="stealth"/>
+            </a:ln>
+            <a:effectLst/>
+          </p:spPr>
+          <p:style>
+            <a:lnRef idx="2">
+              <a:schemeClr val="accent1"/>
+            </a:lnRef>
+            <a:fillRef idx="0">
+              <a:schemeClr val="accent1"/>
+            </a:fillRef>
+            <a:effectRef idx="1">
+              <a:schemeClr val="accent1"/>
+            </a:effectRef>
+            <a:fontRef idx="minor">
+              <a:schemeClr val="tx1"/>
+            </a:fontRef>
+          </p:style>
+        </p:cxnSp>
+        <p:cxnSp>
+          <p:nvCxnSpPr>
+            <p:cNvPr id="98" name="Straight Arrow Connector 97"/>
+            <p:cNvCxnSpPr/>
+            <p:nvPr/>
+          </p:nvCxnSpPr>
+          <p:spPr>
+            <a:xfrm>
+              <a:off x="-70345" y="3033794"/>
+              <a:ext cx="583696" cy="261"/>
+            </a:xfrm>
+            <a:prstGeom prst="straightConnector1">
+              <a:avLst/>
+            </a:prstGeom>
+            <a:ln w="6350" cmpd="sng">
+              <a:solidFill>
+                <a:srgbClr val="000000"/>
+              </a:solidFill>
+              <a:headEnd type="none"/>
+              <a:tailEnd type="stealth"/>
+            </a:ln>
+            <a:effectLst/>
+          </p:spPr>
+          <p:style>
+            <a:lnRef idx="2">
+              <a:schemeClr val="accent1"/>
+            </a:lnRef>
+            <a:fillRef idx="0">
+              <a:schemeClr val="accent1"/>
+            </a:fillRef>
+            <a:effectRef idx="1">
+              <a:schemeClr val="accent1"/>
+            </a:effectRef>
+            <a:fontRef idx="minor">
+              <a:schemeClr val="tx1"/>
+            </a:fontRef>
+          </p:style>
+        </p:cxnSp>
+        <p:cxnSp>
+          <p:nvCxnSpPr>
+            <p:cNvPr id="99" name="Straight Arrow Connector 98"/>
+            <p:cNvCxnSpPr/>
+            <p:nvPr/>
+          </p:nvCxnSpPr>
+          <p:spPr>
+            <a:xfrm>
+              <a:off x="-70344" y="2915921"/>
+              <a:ext cx="583696" cy="261"/>
+            </a:xfrm>
+            <a:prstGeom prst="straightConnector1">
+              <a:avLst/>
+            </a:prstGeom>
+            <a:ln w="6350" cmpd="sng">
+              <a:solidFill>
+                <a:srgbClr val="000000"/>
+              </a:solidFill>
+              <a:headEnd type="none"/>
+              <a:tailEnd type="stealth"/>
+            </a:ln>
+            <a:effectLst/>
+          </p:spPr>
+          <p:style>
+            <a:lnRef idx="2">
+              <a:schemeClr val="accent1"/>
+            </a:lnRef>
+            <a:fillRef idx="0">
+              <a:schemeClr val="accent1"/>
+            </a:fillRef>
+            <a:effectRef idx="1">
+              <a:schemeClr val="accent1"/>
+            </a:effectRef>
+            <a:fontRef idx="minor">
+              <a:schemeClr val="tx1"/>
+            </a:fontRef>
+          </p:style>
+        </p:cxnSp>
         <p:sp>
           <p:nvSpPr>
             <p:cNvPr id="54" name="Document 53"/>
@@ -4875,7 +4845,7 @@
                 <a:srgbClr val="000000"/>
               </a:solidFill>
               <a:headEnd type="none"/>
-              <a:tailEnd type="triangle"/>
+              <a:tailEnd type="stealth"/>
             </a:ln>
             <a:effectLst/>
           </p:spPr>
@@ -4913,7 +4883,7 @@
                 <a:srgbClr val="000000"/>
               </a:solidFill>
               <a:headEnd type="none"/>
-              <a:tailEnd type="triangle"/>
+              <a:tailEnd type="stealth"/>
             </a:ln>
             <a:effectLst/>
           </p:spPr>
@@ -4956,7 +4926,7 @@
               <a:solidFill>
                 <a:schemeClr val="tx1"/>
               </a:solidFill>
-              <a:tailEnd type="triangle"/>
+              <a:tailEnd type="stealth"/>
             </a:ln>
             <a:effectLst/>
           </p:spPr>

</xml_diff>